<commit_message>
adding in new slides for RND and project updates
</commit_message>
<xml_diff>
--- a/ClassMaterials/IntroToUnitTesting/Slides/Part1-DP-Review.pptx
+++ b/ClassMaterials/IntroToUnitTesting/Slides/Part1-DP-Review.pptx
@@ -5,10 +5,10 @@
     <p:sldMasterId id="2147483927" r:id="rId1"/>
   </p:sldMasterIdLst>
   <p:notesMasterIdLst>
-    <p:notesMasterId r:id="rId7"/>
+    <p:notesMasterId r:id="rId9"/>
   </p:notesMasterIdLst>
   <p:handoutMasterIdLst>
-    <p:handoutMasterId r:id="rId8"/>
+    <p:handoutMasterId r:id="rId10"/>
   </p:handoutMasterIdLst>
   <p:sldIdLst>
     <p:sldId id="256" r:id="rId2"/>
@@ -16,6 +16,8 @@
     <p:sldId id="305" r:id="rId4"/>
     <p:sldId id="306" r:id="rId5"/>
     <p:sldId id="293" r:id="rId6"/>
+    <p:sldId id="313" r:id="rId7"/>
+    <p:sldId id="314" r:id="rId8"/>
   </p:sldIdLst>
   <p:sldSz cx="9144000" cy="6858000" type="screen4x3"/>
   <p:notesSz cx="7010400" cy="9296400"/>
@@ -280,7 +282,7 @@
               <a:pPr>
                 <a:defRPr/>
               </a:pPr>
-              <a:t>11/22/2022</a:t>
+              <a:t>1/5/2023</a:t>
             </a:fld>
             <a:endParaRPr lang="en-US" dirty="0"/>
           </a:p>
@@ -515,7 +517,7 @@
               <a:pPr>
                 <a:defRPr/>
               </a:pPr>
-              <a:t>11/22/2022</a:t>
+              <a:t>1/5/2023</a:t>
             </a:fld>
             <a:endParaRPr lang="en-US" dirty="0"/>
           </a:p>
@@ -1243,7 +1245,7 @@
               <a:pPr>
                 <a:defRPr/>
               </a:pPr>
-              <a:t>Tuesday, November 22, 2022</a:t>
+              <a:t>Thursday, January 5, 2023</a:t>
             </a:fld>
             <a:endParaRPr lang="en-US" dirty="0"/>
           </a:p>
@@ -1426,7 +1428,7 @@
               <a:pPr>
                 <a:defRPr/>
               </a:pPr>
-              <a:t>Tuesday, November 22, 2022</a:t>
+              <a:t>Thursday, January 5, 2023</a:t>
             </a:fld>
             <a:endParaRPr lang="en-US" dirty="0"/>
           </a:p>
@@ -1619,7 +1621,7 @@
               <a:pPr>
                 <a:defRPr/>
               </a:pPr>
-              <a:t>Tuesday, November 22, 2022</a:t>
+              <a:t>Thursday, January 5, 2023</a:t>
             </a:fld>
             <a:endParaRPr lang="en-US" dirty="0"/>
           </a:p>
@@ -1802,7 +1804,7 @@
               <a:pPr>
                 <a:defRPr/>
               </a:pPr>
-              <a:t>Tuesday, November 22, 2022</a:t>
+              <a:t>Thursday, January 5, 2023</a:t>
             </a:fld>
             <a:endParaRPr lang="en-US" dirty="0"/>
           </a:p>
@@ -2062,7 +2064,7 @@
               <a:pPr>
                 <a:defRPr/>
               </a:pPr>
-              <a:t>Tuesday, November 22, 2022</a:t>
+              <a:t>Thursday, January 5, 2023</a:t>
             </a:fld>
             <a:endParaRPr lang="en-US" dirty="0"/>
           </a:p>
@@ -2362,7 +2364,7 @@
               <a:pPr>
                 <a:defRPr/>
               </a:pPr>
-              <a:t>Tuesday, November 22, 2022</a:t>
+              <a:t>Thursday, January 5, 2023</a:t>
             </a:fld>
             <a:endParaRPr lang="en-US" dirty="0"/>
           </a:p>
@@ -2796,7 +2798,7 @@
               <a:pPr>
                 <a:defRPr/>
               </a:pPr>
-              <a:t>Tuesday, November 22, 2022</a:t>
+              <a:t>Thursday, January 5, 2023</a:t>
             </a:fld>
             <a:endParaRPr lang="en-US" dirty="0"/>
           </a:p>
@@ -2928,7 +2930,7 @@
               <a:pPr>
                 <a:defRPr/>
               </a:pPr>
-              <a:t>Tuesday, November 22, 2022</a:t>
+              <a:t>Thursday, January 5, 2023</a:t>
             </a:fld>
             <a:endParaRPr lang="en-US" dirty="0"/>
           </a:p>
@@ -3038,7 +3040,7 @@
               <a:pPr>
                 <a:defRPr/>
               </a:pPr>
-              <a:t>Tuesday, November 22, 2022</a:t>
+              <a:t>Thursday, January 5, 2023</a:t>
             </a:fld>
             <a:endParaRPr lang="en-US" dirty="0"/>
           </a:p>
@@ -3328,7 +3330,7 @@
               <a:pPr>
                 <a:defRPr/>
               </a:pPr>
-              <a:t>Tuesday, November 22, 2022</a:t>
+              <a:t>Thursday, January 5, 2023</a:t>
             </a:fld>
             <a:endParaRPr lang="en-US" dirty="0"/>
           </a:p>
@@ -3595,7 +3597,7 @@
               <a:pPr>
                 <a:defRPr/>
               </a:pPr>
-              <a:t>Tuesday, November 22, 2022</a:t>
+              <a:t>Thursday, January 5, 2023</a:t>
             </a:fld>
             <a:endParaRPr lang="en-US" dirty="0"/>
           </a:p>
@@ -3821,7 +3823,7 @@
               <a:pPr>
                 <a:defRPr/>
               </a:pPr>
-              <a:t>Tuesday, November 22, 2022</a:t>
+              <a:t>Thursday, January 5, 2023</a:t>
             </a:fld>
             <a:endParaRPr lang="en-US" dirty="0"/>
           </a:p>
@@ -4916,6 +4918,656 @@
     <p:extLst>
       <p:ext uri="{BB962C8B-B14F-4D97-AF65-F5344CB8AC3E}">
         <p14:creationId xmlns:p14="http://schemas.microsoft.com/office/powerpoint/2010/main" val="517551583"/>
+      </p:ext>
+    </p:extLst>
+  </p:cSld>
+  <p:clrMapOvr>
+    <a:masterClrMapping/>
+  </p:clrMapOvr>
+</p:sld>
+</file>
+
+<file path=ppt/slides/slide6.xml><?xml version="1.0" encoding="utf-8"?>
+<p:sld xmlns:a="http://schemas.openxmlformats.org/drawingml/2006/main" xmlns:r="http://schemas.openxmlformats.org/officeDocument/2006/relationships" xmlns:p="http://schemas.openxmlformats.org/presentationml/2006/main">
+  <p:cSld>
+    <p:spTree>
+      <p:nvGrpSpPr>
+        <p:cNvPr id="1" name=""/>
+        <p:cNvGrpSpPr/>
+        <p:nvPr/>
+      </p:nvGrpSpPr>
+      <p:grpSpPr>
+        <a:xfrm>
+          <a:off x="0" y="0"/>
+          <a:ext cx="0" cy="0"/>
+          <a:chOff x="0" y="0"/>
+          <a:chExt cx="0" cy="0"/>
+        </a:xfrm>
+      </p:grpSpPr>
+      <p:sp>
+        <p:nvSpPr>
+          <p:cNvPr id="2" name="Title 1"/>
+          <p:cNvSpPr>
+            <a:spLocks noGrp="1"/>
+          </p:cNvSpPr>
+          <p:nvPr>
+            <p:ph type="title"/>
+          </p:nvPr>
+        </p:nvSpPr>
+        <p:spPr>
+          <a:xfrm>
+            <a:off x="628650" y="365127"/>
+            <a:ext cx="7886700" cy="922498"/>
+          </a:xfrm>
+        </p:spPr>
+        <p:txBody>
+          <a:bodyPr>
+            <a:normAutofit/>
+          </a:bodyPr>
+          <a:lstStyle/>
+          <a:p>
+            <a:r>
+              <a:rPr lang="en-US" dirty="0"/>
+              <a:t>Questions about DPs thus far?</a:t>
+            </a:r>
+          </a:p>
+        </p:txBody>
+      </p:sp>
+      <p:sp>
+        <p:nvSpPr>
+          <p:cNvPr id="3" name="Content Placeholder 2"/>
+          <p:cNvSpPr>
+            <a:spLocks noGrp="1"/>
+          </p:cNvSpPr>
+          <p:nvPr>
+            <p:ph idx="1"/>
+          </p:nvPr>
+        </p:nvSpPr>
+        <p:spPr>
+          <a:xfrm>
+            <a:off x="335901" y="1287625"/>
+            <a:ext cx="8546841" cy="5570375"/>
+          </a:xfrm>
+        </p:spPr>
+        <p:txBody>
+          <a:bodyPr>
+            <a:normAutofit fontScale="62500" lnSpcReduction="20000"/>
+          </a:bodyPr>
+          <a:lstStyle/>
+          <a:p>
+            <a:pPr marL="457200" indent="-457200" fontAlgn="base">
+              <a:buFont typeface="+mj-lt"/>
+              <a:buAutoNum type="arabicPeriod"/>
+            </a:pPr>
+            <a:r>
+              <a:rPr lang="en-US" sz="2400" dirty="0">
+                <a:highlight>
+                  <a:srgbClr val="FFFF00"/>
+                </a:highlight>
+              </a:rPr>
+              <a:t>Make sure your design </a:t>
+            </a:r>
+            <a:r>
+              <a:rPr lang="en-US" sz="2400" b="1" dirty="0">
+                <a:highlight>
+                  <a:srgbClr val="FFFF00"/>
+                </a:highlight>
+              </a:rPr>
+              <a:t>allows proper functionality</a:t>
+            </a:r>
+            <a:endParaRPr lang="en-US" sz="2400" dirty="0">
+              <a:highlight>
+                <a:srgbClr val="FFFF00"/>
+              </a:highlight>
+            </a:endParaRPr>
+          </a:p>
+          <a:p>
+            <a:pPr marL="685800" lvl="1" indent="-342900" fontAlgn="base">
+              <a:buFont typeface="+mj-lt"/>
+              <a:buAutoNum type="alphaLcParenR"/>
+            </a:pPr>
+            <a:r>
+              <a:rPr lang="en-US" dirty="0">
+                <a:highlight>
+                  <a:srgbClr val="FFFF00"/>
+                </a:highlight>
+              </a:rPr>
+              <a:t>Must be able to </a:t>
+            </a:r>
+            <a:r>
+              <a:rPr lang="en-US" b="1" dirty="0">
+                <a:highlight>
+                  <a:srgbClr val="FFFF00"/>
+                </a:highlight>
+              </a:rPr>
+              <a:t>store required information</a:t>
+            </a:r>
+            <a:r>
+              <a:rPr lang="en-US" dirty="0">
+                <a:highlight>
+                  <a:srgbClr val="FFFF00"/>
+                </a:highlight>
+              </a:rPr>
+              <a:t> (one/many to one/many relationships)</a:t>
+            </a:r>
+          </a:p>
+          <a:p>
+            <a:pPr marL="685800" lvl="1" indent="-342900" fontAlgn="base">
+              <a:buFont typeface="+mj-lt"/>
+              <a:buAutoNum type="alphaLcParenR"/>
+            </a:pPr>
+            <a:r>
+              <a:rPr lang="en-US" dirty="0">
+                <a:highlight>
+                  <a:srgbClr val="FFFF00"/>
+                </a:highlight>
+              </a:rPr>
+              <a:t>Must be able to </a:t>
+            </a:r>
+            <a:r>
+              <a:rPr lang="en-US" b="1" dirty="0">
+                <a:highlight>
+                  <a:srgbClr val="FFFF00"/>
+                </a:highlight>
+              </a:rPr>
+              <a:t>access the required information</a:t>
+            </a:r>
+            <a:r>
+              <a:rPr lang="en-US" dirty="0">
+                <a:highlight>
+                  <a:srgbClr val="FFFF00"/>
+                </a:highlight>
+              </a:rPr>
+              <a:t> to accomplish tasks</a:t>
+            </a:r>
+          </a:p>
+          <a:p>
+            <a:pPr marL="685800" lvl="1" indent="-342900" fontAlgn="base">
+              <a:buFont typeface="+mj-lt"/>
+              <a:buAutoNum type="alphaLcParenR"/>
+            </a:pPr>
+            <a:r>
+              <a:rPr lang="en-US" dirty="0">
+                <a:highlight>
+                  <a:srgbClr val="FFFF00"/>
+                </a:highlight>
+              </a:rPr>
+              <a:t>Data should </a:t>
+            </a:r>
+            <a:r>
+              <a:rPr lang="en-US" b="1" dirty="0">
+                <a:highlight>
+                  <a:srgbClr val="FFFF00"/>
+                </a:highlight>
+              </a:rPr>
+              <a:t>not be duplicated</a:t>
+            </a:r>
+            <a:r>
+              <a:rPr lang="en-US" dirty="0">
+                <a:highlight>
+                  <a:srgbClr val="FFFF00"/>
+                </a:highlight>
+              </a:rPr>
+              <a:t> (id/identifiers are OK!)</a:t>
+            </a:r>
+            <a:endParaRPr lang="en-US" sz="2400" dirty="0">
+              <a:highlight>
+                <a:srgbClr val="FFFF00"/>
+              </a:highlight>
+            </a:endParaRPr>
+          </a:p>
+          <a:p>
+            <a:pPr marL="457200" indent="-457200">
+              <a:buFont typeface="+mj-lt"/>
+              <a:buAutoNum type="arabicPeriod"/>
+            </a:pPr>
+            <a:r>
+              <a:rPr lang="en-US" sz="2400" dirty="0">
+                <a:highlight>
+                  <a:srgbClr val="FFFF00"/>
+                </a:highlight>
+              </a:rPr>
+              <a:t>Structure design </a:t>
+            </a:r>
+            <a:r>
+              <a:rPr lang="en-US" sz="2400" b="1" dirty="0">
+                <a:highlight>
+                  <a:srgbClr val="FFFF00"/>
+                </a:highlight>
+              </a:rPr>
+              <a:t>around the data</a:t>
+            </a:r>
+            <a:r>
+              <a:rPr lang="en-US" sz="2400" dirty="0">
+                <a:highlight>
+                  <a:srgbClr val="FFFF00"/>
+                </a:highlight>
+              </a:rPr>
+              <a:t> to be stored</a:t>
+            </a:r>
+          </a:p>
+          <a:p>
+            <a:pPr marL="685800" lvl="1" indent="-342900" fontAlgn="base">
+              <a:buFont typeface="+mj-lt"/>
+              <a:buAutoNum type="alphaLcParenR"/>
+            </a:pPr>
+            <a:r>
+              <a:rPr lang="en-US" b="1" dirty="0">
+                <a:highlight>
+                  <a:srgbClr val="FFFF00"/>
+                </a:highlight>
+              </a:rPr>
+              <a:t>Nouns should become classes</a:t>
+            </a:r>
+            <a:endParaRPr lang="en-US" dirty="0">
+              <a:highlight>
+                <a:srgbClr val="FFFF00"/>
+              </a:highlight>
+            </a:endParaRPr>
+          </a:p>
+          <a:p>
+            <a:pPr marL="685800" lvl="1" indent="-342900" fontAlgn="base">
+              <a:buFont typeface="+mj-lt"/>
+              <a:buAutoNum type="alphaLcParenR"/>
+            </a:pPr>
+            <a:r>
+              <a:rPr lang="en-US" b="1" dirty="0">
+                <a:highlight>
+                  <a:srgbClr val="FFFF00"/>
+                </a:highlight>
+              </a:rPr>
+              <a:t>Classes should have intelligent behaviors</a:t>
+            </a:r>
+            <a:r>
+              <a:rPr lang="en-US" dirty="0">
+                <a:highlight>
+                  <a:srgbClr val="FFFF00"/>
+                </a:highlight>
+              </a:rPr>
+              <a:t> (methods) </a:t>
+            </a:r>
+            <a:r>
+              <a:rPr lang="en-US" b="1" dirty="0">
+                <a:highlight>
+                  <a:srgbClr val="FFFF00"/>
+                </a:highlight>
+              </a:rPr>
+              <a:t>that may operate on their data</a:t>
+            </a:r>
+            <a:endParaRPr lang="en-US" dirty="0">
+              <a:highlight>
+                <a:srgbClr val="FFFF00"/>
+              </a:highlight>
+            </a:endParaRPr>
+          </a:p>
+          <a:p>
+            <a:pPr marL="457200" indent="-457200" fontAlgn="base">
+              <a:buFont typeface="+mj-lt"/>
+              <a:buAutoNum type="arabicPeriod"/>
+            </a:pPr>
+            <a:r>
+              <a:rPr lang="en-US" sz="2400" dirty="0">
+                <a:highlight>
+                  <a:srgbClr val="FFFF00"/>
+                </a:highlight>
+              </a:rPr>
+              <a:t>Functionality should be </a:t>
+            </a:r>
+            <a:r>
+              <a:rPr lang="en-US" sz="2400" b="1" dirty="0">
+                <a:highlight>
+                  <a:srgbClr val="FFFF00"/>
+                </a:highlight>
+              </a:rPr>
+              <a:t>distributed efficiently</a:t>
+            </a:r>
+            <a:endParaRPr lang="en-US" sz="2400" dirty="0">
+              <a:highlight>
+                <a:srgbClr val="FFFF00"/>
+              </a:highlight>
+            </a:endParaRPr>
+          </a:p>
+          <a:p>
+            <a:pPr marL="685800" lvl="1" indent="-342900" fontAlgn="base">
+              <a:buFont typeface="+mj-lt"/>
+              <a:buAutoNum type="alphaLcParenR"/>
+            </a:pPr>
+            <a:r>
+              <a:rPr lang="en-US" b="1" dirty="0">
+                <a:highlight>
+                  <a:srgbClr val="FFFF00"/>
+                </a:highlight>
+              </a:rPr>
+              <a:t>No class/part should get too large</a:t>
+            </a:r>
+          </a:p>
+          <a:p>
+            <a:pPr marL="685800" lvl="1" indent="-342900" fontAlgn="base">
+              <a:buFont typeface="+mj-lt"/>
+              <a:buAutoNum type="alphaLcParenR"/>
+            </a:pPr>
+            <a:r>
+              <a:rPr lang="en-US" b="1" dirty="0">
+                <a:highlight>
+                  <a:srgbClr val="FFFF00"/>
+                </a:highlight>
+              </a:rPr>
+              <a:t>Each class should have a single responsibility</a:t>
+            </a:r>
+            <a:r>
+              <a:rPr lang="en-US" dirty="0">
+                <a:highlight>
+                  <a:srgbClr val="FFFF00"/>
+                </a:highlight>
+              </a:rPr>
+              <a:t> it accomplishes</a:t>
+            </a:r>
+          </a:p>
+          <a:p>
+            <a:pPr marL="457200" indent="-457200" fontAlgn="base">
+              <a:buFont typeface="+mj-lt"/>
+              <a:buAutoNum type="arabicPeriod"/>
+            </a:pPr>
+            <a:r>
+              <a:rPr lang="en-US" sz="2400" b="1" dirty="0">
+                <a:highlight>
+                  <a:srgbClr val="FFFF00"/>
+                </a:highlight>
+              </a:rPr>
+              <a:t>Minimize dependencies</a:t>
+            </a:r>
+            <a:r>
+              <a:rPr lang="en-US" sz="2400" dirty="0">
+                <a:highlight>
+                  <a:srgbClr val="FFFF00"/>
+                </a:highlight>
+              </a:rPr>
+              <a:t> between objects when it does not disrupt usability or extendibility</a:t>
+            </a:r>
+          </a:p>
+          <a:p>
+            <a:pPr marL="685800" lvl="1" indent="-342900" fontAlgn="base">
+              <a:buFont typeface="+mj-lt"/>
+              <a:buAutoNum type="alphaLcParenR"/>
+            </a:pPr>
+            <a:r>
+              <a:rPr lang="en-US" dirty="0">
+                <a:highlight>
+                  <a:srgbClr val="FFFF00"/>
+                </a:highlight>
+              </a:rPr>
+              <a:t>Tell don't ask</a:t>
+            </a:r>
+          </a:p>
+          <a:p>
+            <a:pPr marL="685800" lvl="1" indent="-342900" fontAlgn="base">
+              <a:buFont typeface="+mj-lt"/>
+              <a:buAutoNum type="alphaLcParenR"/>
+            </a:pPr>
+            <a:r>
+              <a:rPr lang="en-US" dirty="0">
+                <a:highlight>
+                  <a:srgbClr val="FFFF00"/>
+                </a:highlight>
+              </a:rPr>
+              <a:t>Don't have message chains</a:t>
+            </a:r>
+          </a:p>
+          <a:p>
+            <a:pPr marL="457200" indent="-457200" fontAlgn="base">
+              <a:buFont typeface="+mj-lt"/>
+              <a:buAutoNum type="arabicPeriod"/>
+            </a:pPr>
+            <a:r>
+              <a:rPr lang="en-US" sz="2400" b="1" dirty="0">
+                <a:highlight>
+                  <a:srgbClr val="FFFF00"/>
+                </a:highlight>
+              </a:rPr>
+              <a:t>Don't duplicate</a:t>
+            </a:r>
+            <a:r>
+              <a:rPr lang="en-US" sz="2400" dirty="0">
+                <a:highlight>
+                  <a:srgbClr val="FFFF00"/>
+                </a:highlight>
+              </a:rPr>
+              <a:t> code</a:t>
+            </a:r>
+          </a:p>
+          <a:p>
+            <a:pPr marL="685800" lvl="1" indent="-342900" fontAlgn="base">
+              <a:buFont typeface="+mj-lt"/>
+              <a:buAutoNum type="alphaLcParenR"/>
+            </a:pPr>
+            <a:r>
+              <a:rPr lang="en-US" dirty="0">
+                <a:highlight>
+                  <a:srgbClr val="FFFF00"/>
+                </a:highlight>
+              </a:rPr>
+              <a:t>Similar "chunks" of code should be </a:t>
+            </a:r>
+            <a:r>
+              <a:rPr lang="en-US" b="1" dirty="0">
+                <a:highlight>
+                  <a:srgbClr val="FFFF00"/>
+                </a:highlight>
+              </a:rPr>
+              <a:t>unified into functions</a:t>
+            </a:r>
+            <a:endParaRPr lang="en-US" dirty="0">
+              <a:highlight>
+                <a:srgbClr val="FFFF00"/>
+              </a:highlight>
+            </a:endParaRPr>
+          </a:p>
+          <a:p>
+            <a:pPr marL="685800" lvl="1" indent="-342900" fontAlgn="base">
+              <a:buFont typeface="+mj-lt"/>
+              <a:buAutoNum type="alphaLcParenR"/>
+            </a:pPr>
+            <a:r>
+              <a:rPr lang="en-US" dirty="0"/>
+              <a:t>Classes with similar features should be given </a:t>
+            </a:r>
+            <a:r>
+              <a:rPr lang="en-US" b="1" dirty="0"/>
+              <a:t>common interfaces</a:t>
+            </a:r>
+            <a:endParaRPr lang="en-US" dirty="0"/>
+          </a:p>
+          <a:p>
+            <a:pPr marL="685800" lvl="1" indent="-342900">
+              <a:buFont typeface="+mj-lt"/>
+              <a:buAutoNum type="alphaLcParenR"/>
+            </a:pPr>
+            <a:r>
+              <a:rPr lang="en-US" dirty="0"/>
+              <a:t>Classes with similar internals should be simplified using </a:t>
+            </a:r>
+            <a:r>
+              <a:rPr lang="en-US" b="1" dirty="0"/>
+              <a:t>inheritance</a:t>
+            </a:r>
+            <a:endParaRPr lang="en-US" dirty="0"/>
+          </a:p>
+        </p:txBody>
+      </p:sp>
+    </p:spTree>
+    <p:extLst>
+      <p:ext uri="{BB962C8B-B14F-4D97-AF65-F5344CB8AC3E}">
+        <p14:creationId xmlns:p14="http://schemas.microsoft.com/office/powerpoint/2010/main" val="3813012996"/>
+      </p:ext>
+    </p:extLst>
+  </p:cSld>
+  <p:clrMapOvr>
+    <a:masterClrMapping/>
+  </p:clrMapOvr>
+</p:sld>
+</file>
+
+<file path=ppt/slides/slide7.xml><?xml version="1.0" encoding="utf-8"?>
+<p:sld xmlns:a="http://schemas.openxmlformats.org/drawingml/2006/main" xmlns:r="http://schemas.openxmlformats.org/officeDocument/2006/relationships" xmlns:p="http://schemas.openxmlformats.org/presentationml/2006/main">
+  <p:cSld>
+    <p:spTree>
+      <p:nvGrpSpPr>
+        <p:cNvPr id="1" name=""/>
+        <p:cNvGrpSpPr/>
+        <p:nvPr/>
+      </p:nvGrpSpPr>
+      <p:grpSpPr>
+        <a:xfrm>
+          <a:off x="0" y="0"/>
+          <a:ext cx="0" cy="0"/>
+          <a:chOff x="0" y="0"/>
+          <a:chExt cx="0" cy="0"/>
+        </a:xfrm>
+      </p:grpSpPr>
+      <p:sp>
+        <p:nvSpPr>
+          <p:cNvPr id="2" name="Title 1">
+            <a:extLst>
+              <a:ext uri="{FF2B5EF4-FFF2-40B4-BE49-F238E27FC236}">
+                <a16:creationId xmlns:a16="http://schemas.microsoft.com/office/drawing/2014/main" id="{86790ECD-8183-55EE-2AE4-41CF636EF5F6}"/>
+              </a:ext>
+            </a:extLst>
+          </p:cNvPr>
+          <p:cNvSpPr>
+            <a:spLocks noGrp="1"/>
+          </p:cNvSpPr>
+          <p:nvPr>
+            <p:ph type="title"/>
+          </p:nvPr>
+        </p:nvSpPr>
+        <p:spPr/>
+        <p:txBody>
+          <a:bodyPr/>
+          <a:lstStyle/>
+          <a:p>
+            <a:r>
+              <a:rPr lang="en-US" dirty="0"/>
+              <a:t>Example DPs for Practice!</a:t>
+            </a:r>
+          </a:p>
+        </p:txBody>
+      </p:sp>
+      <p:sp>
+        <p:nvSpPr>
+          <p:cNvPr id="3" name="Content Placeholder 2">
+            <a:extLst>
+              <a:ext uri="{FF2B5EF4-FFF2-40B4-BE49-F238E27FC236}">
+                <a16:creationId xmlns:a16="http://schemas.microsoft.com/office/drawing/2014/main" id="{3353406D-B5E3-38EB-E7A1-3B34C05703B3}"/>
+              </a:ext>
+            </a:extLst>
+          </p:cNvPr>
+          <p:cNvSpPr>
+            <a:spLocks noGrp="1"/>
+          </p:cNvSpPr>
+          <p:nvPr>
+            <p:ph idx="1"/>
+          </p:nvPr>
+        </p:nvSpPr>
+        <p:spPr>
+          <a:xfrm>
+            <a:off x="280219" y="1600200"/>
+            <a:ext cx="5114925" cy="2392363"/>
+          </a:xfrm>
+        </p:spPr>
+        <p:txBody>
+          <a:bodyPr/>
+          <a:lstStyle/>
+          <a:p>
+            <a:pPr marL="0" indent="0">
+              <a:buNone/>
+            </a:pPr>
+            <a:r>
+              <a:rPr lang="en-US" dirty="0">
+                <a:hlinkClick r:id="rId2"/>
+              </a:rPr>
+              <a:t>https://github.com/RHIT-CSSE/csse220/tree/master/Docs/ExampleDesignProblems</a:t>
+            </a:r>
+            <a:endParaRPr lang="en-US" dirty="0"/>
+          </a:p>
+          <a:p>
+            <a:endParaRPr lang="en-US" dirty="0"/>
+          </a:p>
+        </p:txBody>
+      </p:sp>
+      <p:pic>
+        <p:nvPicPr>
+          <p:cNvPr id="5" name="Picture 4">
+            <a:extLst>
+              <a:ext uri="{FF2B5EF4-FFF2-40B4-BE49-F238E27FC236}">
+                <a16:creationId xmlns:a16="http://schemas.microsoft.com/office/drawing/2014/main" id="{5A269C7A-E2B5-45A7-6F11-21D07C0EC00A}"/>
+              </a:ext>
+            </a:extLst>
+          </p:cNvPr>
+          <p:cNvPicPr>
+            <a:picLocks noChangeAspect="1"/>
+          </p:cNvPicPr>
+          <p:nvPr/>
+        </p:nvPicPr>
+        <p:blipFill>
+          <a:blip r:embed="rId3"/>
+          <a:stretch>
+            <a:fillRect/>
+          </a:stretch>
+        </p:blipFill>
+        <p:spPr>
+          <a:xfrm>
+            <a:off x="6005543" y="1417637"/>
+            <a:ext cx="3022593" cy="4771667"/>
+          </a:xfrm>
+          <a:prstGeom prst="rect">
+            <a:avLst/>
+          </a:prstGeom>
+          <a:ln>
+            <a:solidFill>
+              <a:schemeClr val="tx1"/>
+            </a:solidFill>
+          </a:ln>
+        </p:spPr>
+      </p:pic>
+      <p:pic>
+        <p:nvPicPr>
+          <p:cNvPr id="7" name="Picture 6">
+            <a:extLst>
+              <a:ext uri="{FF2B5EF4-FFF2-40B4-BE49-F238E27FC236}">
+                <a16:creationId xmlns:a16="http://schemas.microsoft.com/office/drawing/2014/main" id="{2E13484C-A117-05BB-2909-5FBE42364E7D}"/>
+              </a:ext>
+            </a:extLst>
+          </p:cNvPr>
+          <p:cNvPicPr>
+            <a:picLocks noChangeAspect="1"/>
+          </p:cNvPicPr>
+          <p:nvPr/>
+        </p:nvPicPr>
+        <p:blipFill>
+          <a:blip r:embed="rId4"/>
+          <a:stretch>
+            <a:fillRect/>
+          </a:stretch>
+        </p:blipFill>
+        <p:spPr>
+          <a:xfrm>
+            <a:off x="248264" y="3505200"/>
+            <a:ext cx="5387770" cy="2268063"/>
+          </a:xfrm>
+          <a:prstGeom prst="rect">
+            <a:avLst/>
+          </a:prstGeom>
+          <a:ln>
+            <a:solidFill>
+              <a:schemeClr val="tx1"/>
+            </a:solidFill>
+          </a:ln>
+        </p:spPr>
+      </p:pic>
+    </p:spTree>
+    <p:extLst>
+      <p:ext uri="{BB962C8B-B14F-4D97-AF65-F5344CB8AC3E}">
+        <p14:creationId xmlns:p14="http://schemas.microsoft.com/office/powerpoint/2010/main" val="837567995"/>
       </p:ext>
     </p:extLst>
   </p:cSld>

</xml_diff>

<commit_message>
updating unit testing slides
</commit_message>
<xml_diff>
--- a/ClassMaterials/IntroToUnitTesting/Slides/Part1-DP-Review.pptx
+++ b/ClassMaterials/IntroToUnitTesting/Slides/Part1-DP-Review.pptx
@@ -282,7 +282,7 @@
               <a:pPr>
                 <a:defRPr/>
               </a:pPr>
-              <a:t>1/5/2023</a:t>
+              <a:t>3/27/2023</a:t>
             </a:fld>
             <a:endParaRPr lang="en-US" dirty="0"/>
           </a:p>
@@ -398,6 +398,91 @@
   </p:cSld>
   <p:clrMap bg1="lt1" tx1="dk1" bg2="lt2" tx2="dk2" accent1="accent1" accent2="accent2" accent3="accent3" accent4="accent4" accent5="accent5" accent6="accent6" hlink="hlink" folHlink="folHlink"/>
 </p:handoutMaster>
+</file>
+
+<file path=ppt/ink/ink1.xml><?xml version="1.0" encoding="utf-8"?>
+<inkml:ink xmlns:inkml="http://www.w3.org/2003/InkML">
+  <inkml:definitions>
+    <inkml:context xml:id="ctx0">
+      <inkml:inkSource xml:id="inkSrc0">
+        <inkml:traceFormat>
+          <inkml:channel name="X" type="integer" min="-2.14748E9" max="2.14748E9" units="cm"/>
+          <inkml:channel name="Y" type="integer" min="-2.14748E9" max="2.14748E9" units="cm"/>
+          <inkml:channel name="F" type="integer" max="32767" units="dev"/>
+        </inkml:traceFormat>
+        <inkml:channelProperties>
+          <inkml:channelProperty channel="X" name="resolution" value="1000" units="1/cm"/>
+          <inkml:channelProperty channel="Y" name="resolution" value="1000" units="1/cm"/>
+          <inkml:channelProperty channel="F" name="resolution" value="0" units="1/dev"/>
+        </inkml:channelProperties>
+      </inkml:inkSource>
+      <inkml:timestamp xml:id="ts0" timeString="2023-03-27T16:11:19.741"/>
+    </inkml:context>
+    <inkml:brush xml:id="br0">
+      <inkml:brushProperty name="width" value="0.05" units="cm"/>
+      <inkml:brushProperty name="height" value="0.05" units="cm"/>
+      <inkml:brushProperty name="color" value="#E71224"/>
+    </inkml:brush>
+  </inkml:definitions>
+  <inkml:trace contextRef="#ctx0" brushRef="#br0">1 0 24575,'182'16'0,"-19"-1"0,482-13 0,-310-4 0,-82 2-1365,-228 0-5461</inkml:trace>
+</inkml:ink>
+</file>
+
+<file path=ppt/ink/ink2.xml><?xml version="1.0" encoding="utf-8"?>
+<inkml:ink xmlns:inkml="http://www.w3.org/2003/InkML">
+  <inkml:definitions>
+    <inkml:context xml:id="ctx0">
+      <inkml:inkSource xml:id="inkSrc0">
+        <inkml:traceFormat>
+          <inkml:channel name="X" type="integer" min="-2.14748E9" max="2.14748E9" units="cm"/>
+          <inkml:channel name="Y" type="integer" min="-2.14748E9" max="2.14748E9" units="cm"/>
+          <inkml:channel name="F" type="integer" max="32767" units="dev"/>
+        </inkml:traceFormat>
+        <inkml:channelProperties>
+          <inkml:channelProperty channel="X" name="resolution" value="1000" units="1/cm"/>
+          <inkml:channelProperty channel="Y" name="resolution" value="1000" units="1/cm"/>
+          <inkml:channelProperty channel="F" name="resolution" value="0" units="1/dev"/>
+        </inkml:channelProperties>
+      </inkml:inkSource>
+      <inkml:timestamp xml:id="ts0" timeString="2023-03-27T16:11:25.393"/>
+    </inkml:context>
+    <inkml:brush xml:id="br0">
+      <inkml:brushProperty name="width" value="0.05" units="cm"/>
+      <inkml:brushProperty name="height" value="0.05" units="cm"/>
+      <inkml:brushProperty name="color" value="#E71224"/>
+    </inkml:brush>
+  </inkml:definitions>
+  <inkml:trace contextRef="#ctx0" brushRef="#br0">1 257 24575,'931'0'0,"-860"-3"0,72-13 0,-57 5 0,86-16 0,-172 27 0,0 0 0,0 0 0,0 0 0,0 0 0,0 0 0,1 0 0,-1 0 0,0 0 0,0 0 0,0 0 0,1 0 0,-1 0 0,0 0 0,0 0 0,0 0 0,0 0 0,1 0 0,-1 0 0,0 0 0,0 0 0,0 0 0,0 0 0,1 0 0,-1 0 0,0-1 0,0 1 0,0 0 0,0 0 0,0 0 0,1 0 0,-1 0 0,0 0 0,0 0 0,0-1 0,0 1 0,0 0 0,0 0 0,0 0 0,0 0 0,0-1 0,0 1 0,0 0 0,1 0 0,-1 0 0,0 0 0,0-1 0,0 1 0,0 0 0,0 0 0,0 0 0,0-1 0,-1 1 0,1 0 0,0 0 0,0 0 0,0 0 0,0-1 0,0 1 0,0 0 0,0 0 0,0 0 0,0 0 0,0 0 0,-1-1 0,-15-11 0,-27-11 0,20 13 0,3 2 0,-1-2 0,-27-16 0,44 23 0,0 1 0,0-1 0,1 0 0,-1 0 0,1 0 0,-1 0 0,1-1 0,0 1 0,1-1 0,-1 0 0,0 0 0,1 0 0,0 0 0,0 0 0,0-1 0,1 1 0,-3-9 0,4 12 0,0 0 0,0 0 0,0 0 0,0 0 0,-1 0 0,1 0 0,1 0 0,-1 0 0,0 0 0,0 0 0,0 0 0,0 0 0,1 0 0,-1 0 0,1 0 0,-1 0 0,0 0 0,1 0 0,0 0 0,-1 1 0,1-1 0,-1 0 0,1 0 0,0 0 0,0 1 0,-1-1 0,3-1 0,-1 2 0,0-1 0,0 0 0,0 1 0,1 0 0,-1-1 0,0 1 0,0 0 0,0 0 0,1 0 0,-1 0 0,0 0 0,3 1 0,6 2 0,-1 0 0,0 0 0,0 1 0,12 7 0,-9-5 0,-1 1 0,0 1 0,-1 0 0,0 0 0,0 1 0,-1 1 0,0 0 0,10 13 0,-16-18 0,-1 0 0,0 1 0,0 0 0,0 0 0,0 0 0,-1 0 0,0 0 0,0 0 0,-1 1 0,0-1 0,0 0 0,0 1 0,-1-1 0,0 1 0,0-1 0,-1 1 0,1-1 0,-2 1 0,-2 10 0,0-5 0,-1-1 0,0-1 0,0 1 0,-1-1 0,0 0 0,-15 17 0,-13 23 0,6 19-1365,20-51-5461</inkml:trace>
+</inkml:ink>
+</file>
+
+<file path=ppt/ink/ink3.xml><?xml version="1.0" encoding="utf-8"?>
+<inkml:ink xmlns:inkml="http://www.w3.org/2003/InkML">
+  <inkml:definitions>
+    <inkml:context xml:id="ctx0">
+      <inkml:inkSource xml:id="inkSrc0">
+        <inkml:traceFormat>
+          <inkml:channel name="X" type="integer" min="-2.14748E9" max="2.14748E9" units="cm"/>
+          <inkml:channel name="Y" type="integer" min="-2.14748E9" max="2.14748E9" units="cm"/>
+        </inkml:traceFormat>
+        <inkml:channelProperties>
+          <inkml:channelProperty channel="X" name="resolution" value="1000" units="1/cm"/>
+          <inkml:channelProperty channel="Y" name="resolution" value="1000" units="1/cm"/>
+        </inkml:channelProperties>
+      </inkml:inkSource>
+      <inkml:timestamp xml:id="ts0" timeString="2023-03-27T16:11:29.058"/>
+    </inkml:context>
+    <inkml:brush xml:id="br0">
+      <inkml:brushProperty name="width" value="0.3" units="cm"/>
+      <inkml:brushProperty name="height" value="0.6" units="cm"/>
+      <inkml:brushProperty name="color" value="#FFFC00"/>
+      <inkml:brushProperty name="tip" value="rectangle"/>
+      <inkml:brushProperty name="rasterOp" value="maskPen"/>
+      <inkml:brushProperty name="ignorePressure" value="1"/>
+    </inkml:brush>
+  </inkml:definitions>
+  <inkml:trace contextRef="#ctx0" brushRef="#br0">2946 0,'-1575'0,"1528"3,0 2,-76 17,-46 5,115-21,-77 20,34-5,13-6,-2-4,-119 2,-85-15,252 2</inkml:trace>
+</inkml:ink>
 </file>
 
 <file path=ppt/notesMasters/notesMaster1.xml><?xml version="1.0" encoding="utf-8"?>
@@ -517,7 +602,7 @@
               <a:pPr>
                 <a:defRPr/>
               </a:pPr>
-              <a:t>1/5/2023</a:t>
+              <a:t>3/27/2023</a:t>
             </a:fld>
             <a:endParaRPr lang="en-US" dirty="0"/>
           </a:p>
@@ -1245,7 +1330,7 @@
               <a:pPr>
                 <a:defRPr/>
               </a:pPr>
-              <a:t>Thursday, January 5, 2023</a:t>
+              <a:t>Monday, March 27, 2023</a:t>
             </a:fld>
             <a:endParaRPr lang="en-US" dirty="0"/>
           </a:p>
@@ -1428,7 +1513,7 @@
               <a:pPr>
                 <a:defRPr/>
               </a:pPr>
-              <a:t>Thursday, January 5, 2023</a:t>
+              <a:t>Monday, March 27, 2023</a:t>
             </a:fld>
             <a:endParaRPr lang="en-US" dirty="0"/>
           </a:p>
@@ -1621,7 +1706,7 @@
               <a:pPr>
                 <a:defRPr/>
               </a:pPr>
-              <a:t>Thursday, January 5, 2023</a:t>
+              <a:t>Monday, March 27, 2023</a:t>
             </a:fld>
             <a:endParaRPr lang="en-US" dirty="0"/>
           </a:p>
@@ -1804,7 +1889,7 @@
               <a:pPr>
                 <a:defRPr/>
               </a:pPr>
-              <a:t>Thursday, January 5, 2023</a:t>
+              <a:t>Monday, March 27, 2023</a:t>
             </a:fld>
             <a:endParaRPr lang="en-US" dirty="0"/>
           </a:p>
@@ -2064,7 +2149,7 @@
               <a:pPr>
                 <a:defRPr/>
               </a:pPr>
-              <a:t>Thursday, January 5, 2023</a:t>
+              <a:t>Monday, March 27, 2023</a:t>
             </a:fld>
             <a:endParaRPr lang="en-US" dirty="0"/>
           </a:p>
@@ -2364,7 +2449,7 @@
               <a:pPr>
                 <a:defRPr/>
               </a:pPr>
-              <a:t>Thursday, January 5, 2023</a:t>
+              <a:t>Monday, March 27, 2023</a:t>
             </a:fld>
             <a:endParaRPr lang="en-US" dirty="0"/>
           </a:p>
@@ -2798,7 +2883,7 @@
               <a:pPr>
                 <a:defRPr/>
               </a:pPr>
-              <a:t>Thursday, January 5, 2023</a:t>
+              <a:t>Monday, March 27, 2023</a:t>
             </a:fld>
             <a:endParaRPr lang="en-US" dirty="0"/>
           </a:p>
@@ -2930,7 +3015,7 @@
               <a:pPr>
                 <a:defRPr/>
               </a:pPr>
-              <a:t>Thursday, January 5, 2023</a:t>
+              <a:t>Monday, March 27, 2023</a:t>
             </a:fld>
             <a:endParaRPr lang="en-US" dirty="0"/>
           </a:p>
@@ -3040,7 +3125,7 @@
               <a:pPr>
                 <a:defRPr/>
               </a:pPr>
-              <a:t>Thursday, January 5, 2023</a:t>
+              <a:t>Monday, March 27, 2023</a:t>
             </a:fld>
             <a:endParaRPr lang="en-US" dirty="0"/>
           </a:p>
@@ -3330,7 +3415,7 @@
               <a:pPr>
                 <a:defRPr/>
               </a:pPr>
-              <a:t>Thursday, January 5, 2023</a:t>
+              <a:t>Monday, March 27, 2023</a:t>
             </a:fld>
             <a:endParaRPr lang="en-US" dirty="0"/>
           </a:p>
@@ -3597,7 +3682,7 @@
               <a:pPr>
                 <a:defRPr/>
               </a:pPr>
-              <a:t>Thursday, January 5, 2023</a:t>
+              <a:t>Monday, March 27, 2023</a:t>
             </a:fld>
             <a:endParaRPr lang="en-US" dirty="0"/>
           </a:p>
@@ -3823,7 +3908,7 @@
               <a:pPr>
                 <a:defRPr/>
               </a:pPr>
-              <a:t>Thursday, January 5, 2023</a:t>
+              <a:t>Monday, March 27, 2023</a:t>
             </a:fld>
             <a:endParaRPr lang="en-US" dirty="0"/>
           </a:p>
@@ -5496,41 +5581,6 @@
       </p:sp>
       <p:pic>
         <p:nvPicPr>
-          <p:cNvPr id="5" name="Picture 4">
-            <a:extLst>
-              <a:ext uri="{FF2B5EF4-FFF2-40B4-BE49-F238E27FC236}">
-                <a16:creationId xmlns:a16="http://schemas.microsoft.com/office/drawing/2014/main" id="{5A269C7A-E2B5-45A7-6F11-21D07C0EC00A}"/>
-              </a:ext>
-            </a:extLst>
-          </p:cNvPr>
-          <p:cNvPicPr>
-            <a:picLocks noChangeAspect="1"/>
-          </p:cNvPicPr>
-          <p:nvPr/>
-        </p:nvPicPr>
-        <p:blipFill>
-          <a:blip r:embed="rId3"/>
-          <a:stretch>
-            <a:fillRect/>
-          </a:stretch>
-        </p:blipFill>
-        <p:spPr>
-          <a:xfrm>
-            <a:off x="6005543" y="1417637"/>
-            <a:ext cx="3022593" cy="4771667"/>
-          </a:xfrm>
-          <a:prstGeom prst="rect">
-            <a:avLst/>
-          </a:prstGeom>
-          <a:ln>
-            <a:solidFill>
-              <a:schemeClr val="tx1"/>
-            </a:solidFill>
-          </a:ln>
-        </p:spPr>
-      </p:pic>
-      <p:pic>
-        <p:nvPicPr>
           <p:cNvPr id="7" name="Picture 6">
             <a:extLst>
               <a:ext uri="{FF2B5EF4-FFF2-40B4-BE49-F238E27FC236}">
@@ -5544,7 +5594,7 @@
           <p:nvPr/>
         </p:nvPicPr>
         <p:blipFill>
-          <a:blip r:embed="rId4"/>
+          <a:blip r:embed="rId3"/>
           <a:stretch>
             <a:fillRect/>
           </a:stretch>
@@ -5564,6 +5614,194 @@
           </a:ln>
         </p:spPr>
       </p:pic>
+      <p:pic>
+        <p:nvPicPr>
+          <p:cNvPr id="6" name="Picture 5">
+            <a:extLst>
+              <a:ext uri="{FF2B5EF4-FFF2-40B4-BE49-F238E27FC236}">
+                <a16:creationId xmlns:a16="http://schemas.microsoft.com/office/drawing/2014/main" id="{363416B3-746A-CEDF-0C4E-E93A7CBC6819}"/>
+              </a:ext>
+            </a:extLst>
+          </p:cNvPr>
+          <p:cNvPicPr>
+            <a:picLocks noChangeAspect="1"/>
+          </p:cNvPicPr>
+          <p:nvPr/>
+        </p:nvPicPr>
+        <p:blipFill>
+          <a:blip r:embed="rId4"/>
+          <a:stretch>
+            <a:fillRect/>
+          </a:stretch>
+        </p:blipFill>
+        <p:spPr>
+          <a:xfrm>
+            <a:off x="6336437" y="1524000"/>
+            <a:ext cx="2593175" cy="5127912"/>
+          </a:xfrm>
+          <a:prstGeom prst="rect">
+            <a:avLst/>
+          </a:prstGeom>
+          <a:ln>
+            <a:solidFill>
+              <a:schemeClr val="tx1"/>
+            </a:solidFill>
+          </a:ln>
+        </p:spPr>
+      </p:pic>
+      <mc:AlternateContent xmlns:mc="http://schemas.openxmlformats.org/markup-compatibility/2006">
+        <mc:Choice xmlns:p14="http://schemas.microsoft.com/office/powerpoint/2010/main" Requires="p14">
+          <p:contentPart p14:bwMode="auto" r:id="rId5">
+            <p14:nvContentPartPr>
+              <p14:cNvPr id="8" name="Ink 7">
+                <a:extLst>
+                  <a:ext uri="{FF2B5EF4-FFF2-40B4-BE49-F238E27FC236}">
+                    <a16:creationId xmlns:a16="http://schemas.microsoft.com/office/drawing/2014/main" id="{F5D47A91-31E5-85CC-5987-139CB7F41541}"/>
+                  </a:ext>
+                </a:extLst>
+              </p14:cNvPr>
+              <p14:cNvContentPartPr/>
+              <p14:nvPr/>
+            </p14:nvContentPartPr>
+            <p14:xfrm>
+              <a:off x="6495145" y="5443796"/>
+              <a:ext cx="577440" cy="11880"/>
+            </p14:xfrm>
+          </p:contentPart>
+        </mc:Choice>
+        <mc:Fallback>
+          <p:pic>
+            <p:nvPicPr>
+              <p:cNvPr id="8" name="Ink 7">
+                <a:extLst>
+                  <a:ext uri="{FF2B5EF4-FFF2-40B4-BE49-F238E27FC236}">
+                    <a16:creationId xmlns:a16="http://schemas.microsoft.com/office/drawing/2014/main" id="{F5D47A91-31E5-85CC-5987-139CB7F41541}"/>
+                  </a:ext>
+                </a:extLst>
+              </p:cNvPr>
+              <p:cNvPicPr/>
+              <p:nvPr/>
+            </p:nvPicPr>
+            <p:blipFill>
+              <a:blip r:embed="rId6"/>
+              <a:stretch>
+                <a:fillRect/>
+              </a:stretch>
+            </p:blipFill>
+            <p:spPr>
+              <a:xfrm>
+                <a:off x="6486505" y="5434796"/>
+                <a:ext cx="595080" cy="29520"/>
+              </a:xfrm>
+              <a:prstGeom prst="rect">
+                <a:avLst/>
+              </a:prstGeom>
+            </p:spPr>
+          </p:pic>
+        </mc:Fallback>
+      </mc:AlternateContent>
+      <mc:AlternateContent xmlns:mc="http://schemas.openxmlformats.org/markup-compatibility/2006">
+        <mc:Choice xmlns:p14="http://schemas.microsoft.com/office/powerpoint/2010/main" Requires="p14">
+          <p:contentPart p14:bwMode="auto" r:id="rId7">
+            <p14:nvContentPartPr>
+              <p14:cNvPr id="9" name="Ink 8">
+                <a:extLst>
+                  <a:ext uri="{FF2B5EF4-FFF2-40B4-BE49-F238E27FC236}">
+                    <a16:creationId xmlns:a16="http://schemas.microsoft.com/office/drawing/2014/main" id="{D64EAF92-0FEB-149E-7A90-CC17D2302C26}"/>
+                  </a:ext>
+                </a:extLst>
+              </p14:cNvPr>
+              <p14:cNvContentPartPr/>
+              <p14:nvPr/>
+            </p14:nvContentPartPr>
+            <p14:xfrm>
+              <a:off x="6085105" y="6044996"/>
+              <a:ext cx="514440" cy="171720"/>
+            </p14:xfrm>
+          </p:contentPart>
+        </mc:Choice>
+        <mc:Fallback>
+          <p:pic>
+            <p:nvPicPr>
+              <p:cNvPr id="9" name="Ink 8">
+                <a:extLst>
+                  <a:ext uri="{FF2B5EF4-FFF2-40B4-BE49-F238E27FC236}">
+                    <a16:creationId xmlns:a16="http://schemas.microsoft.com/office/drawing/2014/main" id="{D64EAF92-0FEB-149E-7A90-CC17D2302C26}"/>
+                  </a:ext>
+                </a:extLst>
+              </p:cNvPr>
+              <p:cNvPicPr/>
+              <p:nvPr/>
+            </p:nvPicPr>
+            <p:blipFill>
+              <a:blip r:embed="rId8"/>
+              <a:stretch>
+                <a:fillRect/>
+              </a:stretch>
+            </p:blipFill>
+            <p:spPr>
+              <a:xfrm>
+                <a:off x="6076465" y="6036356"/>
+                <a:ext cx="532080" cy="189360"/>
+              </a:xfrm>
+              <a:prstGeom prst="rect">
+                <a:avLst/>
+              </a:prstGeom>
+            </p:spPr>
+          </p:pic>
+        </mc:Fallback>
+      </mc:AlternateContent>
+      <mc:AlternateContent xmlns:mc="http://schemas.openxmlformats.org/markup-compatibility/2006">
+        <mc:Choice xmlns:p14="http://schemas.microsoft.com/office/powerpoint/2010/main" Requires="p14">
+          <p:contentPart p14:bwMode="auto" r:id="rId9">
+            <p14:nvContentPartPr>
+              <p14:cNvPr id="10" name="Ink 9">
+                <a:extLst>
+                  <a:ext uri="{FF2B5EF4-FFF2-40B4-BE49-F238E27FC236}">
+                    <a16:creationId xmlns:a16="http://schemas.microsoft.com/office/drawing/2014/main" id="{0BE0050B-81D4-1CE5-762D-9ACFFAE5265C}"/>
+                  </a:ext>
+                </a:extLst>
+              </p14:cNvPr>
+              <p14:cNvContentPartPr/>
+              <p14:nvPr/>
+            </p14:nvContentPartPr>
+            <p14:xfrm>
+              <a:off x="6643465" y="6106196"/>
+              <a:ext cx="1060920" cy="53640"/>
+            </p14:xfrm>
+          </p:contentPart>
+        </mc:Choice>
+        <mc:Fallback>
+          <p:pic>
+            <p:nvPicPr>
+              <p:cNvPr id="10" name="Ink 9">
+                <a:extLst>
+                  <a:ext uri="{FF2B5EF4-FFF2-40B4-BE49-F238E27FC236}">
+                    <a16:creationId xmlns:a16="http://schemas.microsoft.com/office/drawing/2014/main" id="{0BE0050B-81D4-1CE5-762D-9ACFFAE5265C}"/>
+                  </a:ext>
+                </a:extLst>
+              </p:cNvPr>
+              <p:cNvPicPr/>
+              <p:nvPr/>
+            </p:nvPicPr>
+            <p:blipFill>
+              <a:blip r:embed="rId10"/>
+              <a:stretch>
+                <a:fillRect/>
+              </a:stretch>
+            </p:blipFill>
+            <p:spPr>
+              <a:xfrm>
+                <a:off x="6589465" y="5998196"/>
+                <a:ext cx="1168560" cy="269280"/>
+              </a:xfrm>
+              <a:prstGeom prst="rect">
+                <a:avLst/>
+              </a:prstGeom>
+            </p:spPr>
+          </p:pic>
+        </mc:Fallback>
+      </mc:AlternateContent>
     </p:spTree>
     <p:extLst>
       <p:ext uri="{BB962C8B-B14F-4D97-AF65-F5344CB8AC3E}">

</xml_diff>

<commit_message>
removing passwords from slides and saying to look on board instead
</commit_message>
<xml_diff>
--- a/ClassMaterials/IntroToUnitTesting/Slides/Part1-DP-Review.pptx
+++ b/ClassMaterials/IntroToUnitTesting/Slides/Part1-DP-Review.pptx
@@ -330,7 +330,7 @@
               <a:pPr>
                 <a:defRPr/>
               </a:pPr>
-              <a:t>2/26/2024</a:t>
+              <a:t>3/30/2025</a:t>
             </a:fld>
             <a:endParaRPr lang="en-US" dirty="0"/>
           </a:p>
@@ -650,7 +650,7 @@
               <a:pPr>
                 <a:defRPr/>
               </a:pPr>
-              <a:t>2/26/2024</a:t>
+              <a:t>3/30/2025</a:t>
             </a:fld>
             <a:endParaRPr lang="en-US" dirty="0"/>
           </a:p>
@@ -1468,7 +1468,7 @@
               <a:pPr>
                 <a:defRPr/>
               </a:pPr>
-              <a:t>Monday, February 26, 2024</a:t>
+              <a:t>Sunday, March 30, 2025</a:t>
             </a:fld>
             <a:endParaRPr lang="en-US" dirty="0"/>
           </a:p>
@@ -1651,7 +1651,7 @@
               <a:pPr>
                 <a:defRPr/>
               </a:pPr>
-              <a:t>Monday, February 26, 2024</a:t>
+              <a:t>Sunday, March 30, 2025</a:t>
             </a:fld>
             <a:endParaRPr lang="en-US" dirty="0"/>
           </a:p>
@@ -1844,7 +1844,7 @@
               <a:pPr>
                 <a:defRPr/>
               </a:pPr>
-              <a:t>Monday, February 26, 2024</a:t>
+              <a:t>Sunday, March 30, 2025</a:t>
             </a:fld>
             <a:endParaRPr lang="en-US" dirty="0"/>
           </a:p>
@@ -2027,7 +2027,7 @@
               <a:pPr>
                 <a:defRPr/>
               </a:pPr>
-              <a:t>Monday, February 26, 2024</a:t>
+              <a:t>Sunday, March 30, 2025</a:t>
             </a:fld>
             <a:endParaRPr lang="en-US" dirty="0"/>
           </a:p>
@@ -2287,7 +2287,7 @@
               <a:pPr>
                 <a:defRPr/>
               </a:pPr>
-              <a:t>Monday, February 26, 2024</a:t>
+              <a:t>Sunday, March 30, 2025</a:t>
             </a:fld>
             <a:endParaRPr lang="en-US" dirty="0"/>
           </a:p>
@@ -2587,7 +2587,7 @@
               <a:pPr>
                 <a:defRPr/>
               </a:pPr>
-              <a:t>Monday, February 26, 2024</a:t>
+              <a:t>Sunday, March 30, 2025</a:t>
             </a:fld>
             <a:endParaRPr lang="en-US" dirty="0"/>
           </a:p>
@@ -3021,7 +3021,7 @@
               <a:pPr>
                 <a:defRPr/>
               </a:pPr>
-              <a:t>Monday, February 26, 2024</a:t>
+              <a:t>Sunday, March 30, 2025</a:t>
             </a:fld>
             <a:endParaRPr lang="en-US" dirty="0"/>
           </a:p>
@@ -3153,7 +3153,7 @@
               <a:pPr>
                 <a:defRPr/>
               </a:pPr>
-              <a:t>Monday, February 26, 2024</a:t>
+              <a:t>Sunday, March 30, 2025</a:t>
             </a:fld>
             <a:endParaRPr lang="en-US" dirty="0"/>
           </a:p>
@@ -3263,7 +3263,7 @@
               <a:pPr>
                 <a:defRPr/>
               </a:pPr>
-              <a:t>Monday, February 26, 2024</a:t>
+              <a:t>Sunday, March 30, 2025</a:t>
             </a:fld>
             <a:endParaRPr lang="en-US" dirty="0"/>
           </a:p>
@@ -3553,7 +3553,7 @@
               <a:pPr>
                 <a:defRPr/>
               </a:pPr>
-              <a:t>Monday, February 26, 2024</a:t>
+              <a:t>Sunday, March 30, 2025</a:t>
             </a:fld>
             <a:endParaRPr lang="en-US" dirty="0"/>
           </a:p>
@@ -3820,7 +3820,7 @@
               <a:pPr>
                 <a:defRPr/>
               </a:pPr>
-              <a:t>Monday, February 26, 2024</a:t>
+              <a:t>Sunday, March 30, 2025</a:t>
             </a:fld>
             <a:endParaRPr lang="en-US" dirty="0"/>
           </a:p>
@@ -4046,7 +4046,7 @@
               <a:pPr>
                 <a:defRPr/>
               </a:pPr>
-              <a:t>Monday, February 26, 2024</a:t>
+              <a:t>Sunday, March 30, 2025</a:t>
             </a:fld>
             <a:endParaRPr lang="en-US" dirty="0"/>
           </a:p>
@@ -4682,13 +4682,18 @@
           </a:p>
           <a:p>
             <a:r>
-              <a:rPr lang="en-US" sz="4400" dirty="0">
+              <a:rPr lang="en-US" sz="4400" dirty="0" err="1">
                 <a:highlight>
                   <a:srgbClr val="FFFF00"/>
                 </a:highlight>
               </a:rPr>
-              <a:t>__________</a:t>
-            </a:r>
+              <a:t>howToTest</a:t>
+            </a:r>
+            <a:endParaRPr lang="en-US" sz="4400" dirty="0">
+              <a:highlight>
+                <a:srgbClr val="FFFF00"/>
+              </a:highlight>
+            </a:endParaRPr>
           </a:p>
         </p:txBody>
       </p:sp>

</xml_diff>